<commit_message>
ASP.NET Core Identity 다이어그램 추가.
</commit_message>
<xml_diff>
--- a/Image/Diagram/Canvas.pptx
+++ b/Image/Diagram/Canvas.pptx
@@ -5,10 +5,10 @@
     <p:sldMasterId id="2147483648" r:id="rId1"/>
   </p:sldMasterIdLst>
   <p:notesMasterIdLst>
-    <p:notesMasterId r:id="rId29"/>
+    <p:notesMasterId r:id="rId30"/>
   </p:notesMasterIdLst>
   <p:handoutMasterIdLst>
-    <p:handoutMasterId r:id="rId30"/>
+    <p:handoutMasterId r:id="rId31"/>
   </p:handoutMasterIdLst>
   <p:sldIdLst>
     <p:sldId id="278" r:id="rId2"/>
@@ -38,6 +38,7 @@
     <p:sldId id="280" r:id="rId26"/>
     <p:sldId id="282" r:id="rId27"/>
     <p:sldId id="283" r:id="rId28"/>
+    <p:sldId id="284" r:id="rId29"/>
   </p:sldIdLst>
   <p:sldSz cx="12192000" cy="6858000"/>
   <p:notesSz cx="6858000" cy="9144000"/>
@@ -241,7 +242,7 @@
           <a:p>
             <a:fld id="{29F43AEA-EBFF-4648-88A2-B3AE8909EBED}" type="datetimeFigureOut">
               <a:rPr lang="ko-KR" altLang="en-US" smtClean="0"/>
-              <a:t>2022-09-19</a:t>
+              <a:t>2022-09-26</a:t>
             </a:fld>
             <a:endParaRPr lang="ko-KR" altLang="en-US"/>
           </a:p>
@@ -418,7 +419,7 @@
           <a:p>
             <a:fld id="{D4F45FAA-3284-44C8-A10C-F89E7A7A9D0D}" type="datetimeFigureOut">
               <a:rPr lang="ko-KR" altLang="en-US" smtClean="0"/>
-              <a:t>2022-09-19</a:t>
+              <a:t>2022-09-26</a:t>
             </a:fld>
             <a:endParaRPr lang="ko-KR" altLang="en-US"/>
           </a:p>
@@ -814,7 +815,7 @@
           <a:p>
             <a:fld id="{B5FEAD0D-239A-466E-9319-07628EC22FD2}" type="datetimeFigureOut">
               <a:rPr lang="ko-KR" altLang="en-US" smtClean="0"/>
-              <a:t>2022-09-19</a:t>
+              <a:t>2022-09-26</a:t>
             </a:fld>
             <a:endParaRPr lang="ko-KR" altLang="en-US"/>
           </a:p>
@@ -982,7 +983,7 @@
           <a:p>
             <a:fld id="{B5FEAD0D-239A-466E-9319-07628EC22FD2}" type="datetimeFigureOut">
               <a:rPr lang="ko-KR" altLang="en-US" smtClean="0"/>
-              <a:t>2022-09-19</a:t>
+              <a:t>2022-09-26</a:t>
             </a:fld>
             <a:endParaRPr lang="ko-KR" altLang="en-US"/>
           </a:p>
@@ -1160,7 +1161,7 @@
           <a:p>
             <a:fld id="{B5FEAD0D-239A-466E-9319-07628EC22FD2}" type="datetimeFigureOut">
               <a:rPr lang="ko-KR" altLang="en-US" smtClean="0"/>
-              <a:t>2022-09-19</a:t>
+              <a:t>2022-09-26</a:t>
             </a:fld>
             <a:endParaRPr lang="ko-KR" altLang="en-US"/>
           </a:p>
@@ -1255,7 +1256,7 @@
           <a:p>
             <a:fld id="{B5FEAD0D-239A-466E-9319-07628EC22FD2}" type="datetimeFigureOut">
               <a:rPr lang="ko-KR" altLang="en-US" smtClean="0"/>
-              <a:t>2022-09-19</a:t>
+              <a:t>2022-09-26</a:t>
             </a:fld>
             <a:endParaRPr lang="ko-KR" altLang="en-US"/>
           </a:p>
@@ -1500,7 +1501,7 @@
           <a:p>
             <a:fld id="{B5FEAD0D-239A-466E-9319-07628EC22FD2}" type="datetimeFigureOut">
               <a:rPr lang="ko-KR" altLang="en-US" smtClean="0"/>
-              <a:t>2022-09-19</a:t>
+              <a:t>2022-09-26</a:t>
             </a:fld>
             <a:endParaRPr lang="ko-KR" altLang="en-US"/>
           </a:p>
@@ -1729,7 +1730,7 @@
           <a:p>
             <a:fld id="{B5FEAD0D-239A-466E-9319-07628EC22FD2}" type="datetimeFigureOut">
               <a:rPr lang="ko-KR" altLang="en-US" smtClean="0"/>
-              <a:t>2022-09-19</a:t>
+              <a:t>2022-09-26</a:t>
             </a:fld>
             <a:endParaRPr lang="ko-KR" altLang="en-US"/>
           </a:p>
@@ -2093,7 +2094,7 @@
           <a:p>
             <a:fld id="{B5FEAD0D-239A-466E-9319-07628EC22FD2}" type="datetimeFigureOut">
               <a:rPr lang="ko-KR" altLang="en-US" smtClean="0"/>
-              <a:t>2022-09-19</a:t>
+              <a:t>2022-09-26</a:t>
             </a:fld>
             <a:endParaRPr lang="ko-KR" altLang="en-US"/>
           </a:p>
@@ -2210,7 +2211,7 @@
           <a:p>
             <a:fld id="{B5FEAD0D-239A-466E-9319-07628EC22FD2}" type="datetimeFigureOut">
               <a:rPr lang="ko-KR" altLang="en-US" smtClean="0"/>
-              <a:t>2022-09-19</a:t>
+              <a:t>2022-09-26</a:t>
             </a:fld>
             <a:endParaRPr lang="ko-KR" altLang="en-US"/>
           </a:p>
@@ -2305,7 +2306,7 @@
           <a:p>
             <a:fld id="{B5FEAD0D-239A-466E-9319-07628EC22FD2}" type="datetimeFigureOut">
               <a:rPr lang="ko-KR" altLang="en-US" smtClean="0"/>
-              <a:t>2022-09-19</a:t>
+              <a:t>2022-09-26</a:t>
             </a:fld>
             <a:endParaRPr lang="ko-KR" altLang="en-US"/>
           </a:p>
@@ -2580,7 +2581,7 @@
           <a:p>
             <a:fld id="{B5FEAD0D-239A-466E-9319-07628EC22FD2}" type="datetimeFigureOut">
               <a:rPr lang="ko-KR" altLang="en-US" smtClean="0"/>
-              <a:t>2022-09-19</a:t>
+              <a:t>2022-09-26</a:t>
             </a:fld>
             <a:endParaRPr lang="ko-KR" altLang="en-US"/>
           </a:p>
@@ -2832,7 +2833,7 @@
           <a:p>
             <a:fld id="{B5FEAD0D-239A-466E-9319-07628EC22FD2}" type="datetimeFigureOut">
               <a:rPr lang="ko-KR" altLang="en-US" smtClean="0"/>
-              <a:t>2022-09-19</a:t>
+              <a:t>2022-09-26</a:t>
             </a:fld>
             <a:endParaRPr lang="ko-KR" altLang="en-US"/>
           </a:p>
@@ -3043,7 +3044,7 @@
           <a:p>
             <a:fld id="{B5FEAD0D-239A-466E-9319-07628EC22FD2}" type="datetimeFigureOut">
               <a:rPr lang="ko-KR" altLang="en-US" smtClean="0"/>
-              <a:t>2022-09-19</a:t>
+              <a:t>2022-09-26</a:t>
             </a:fld>
             <a:endParaRPr lang="ko-KR" altLang="en-US"/>
           </a:p>
@@ -20187,8 +20188,8 @@
         </p:nvSpPr>
         <p:spPr>
           <a:xfrm>
-            <a:off x="293913" y="304799"/>
-            <a:ext cx="4528458" cy="5519057"/>
+            <a:off x="1247292" y="493059"/>
+            <a:ext cx="4528458" cy="2402542"/>
           </a:xfrm>
           <a:prstGeom prst="rect">
             <a:avLst/>
@@ -20239,8 +20240,8 @@
         </p:nvSpPr>
         <p:spPr>
           <a:xfrm>
-            <a:off x="514348" y="859970"/>
-            <a:ext cx="4087587" cy="4735285"/>
+            <a:off x="1392650" y="1048230"/>
+            <a:ext cx="4222375" cy="1694970"/>
           </a:xfrm>
           <a:prstGeom prst="rect">
             <a:avLst/>
@@ -20291,8 +20292,8 @@
         </p:nvSpPr>
         <p:spPr>
           <a:xfrm>
-            <a:off x="715552" y="397719"/>
-            <a:ext cx="3685178" cy="369332"/>
+            <a:off x="1668931" y="585978"/>
+            <a:ext cx="3685178" cy="338554"/>
           </a:xfrm>
           <a:prstGeom prst="rect">
             <a:avLst/>
@@ -20307,15 +20308,18 @@
           <a:p>
             <a:pPr algn="ctr"/>
             <a:r>
-              <a:rPr lang="en-US" altLang="ko-KR" b="0" i="0" dirty="0">
+              <a:rPr lang="en-US" altLang="ko-KR" sz="1600" b="0" i="0" dirty="0">
                 <a:solidFill>
                   <a:srgbClr val="292929"/>
                 </a:solidFill>
                 <a:effectLst/>
+                <a:latin typeface="+mj-lt"/>
               </a:rPr>
               <a:t>URI(Uniform resource Identifier)</a:t>
             </a:r>
-            <a:endParaRPr lang="ko-KR" altLang="en-US" dirty="0"/>
+            <a:endParaRPr lang="ko-KR" altLang="en-US" sz="1600" dirty="0">
+              <a:latin typeface="+mj-lt"/>
+            </a:endParaRPr>
           </a:p>
         </p:txBody>
       </p:sp>
@@ -20333,8 +20337,8 @@
         </p:nvSpPr>
         <p:spPr>
           <a:xfrm>
-            <a:off x="715552" y="1034144"/>
-            <a:ext cx="3685178" cy="369332"/>
+            <a:off x="1668931" y="1222403"/>
+            <a:ext cx="3685178" cy="338554"/>
           </a:xfrm>
           <a:prstGeom prst="rect">
             <a:avLst/>
@@ -20349,7 +20353,7 @@
           <a:p>
             <a:pPr algn="ctr"/>
             <a:r>
-              <a:rPr lang="en-US" altLang="ko-KR" b="0" i="0" dirty="0">
+              <a:rPr lang="en-US" altLang="ko-KR" sz="1600" b="0" i="0" dirty="0">
                 <a:solidFill>
                   <a:srgbClr val="292929"/>
                 </a:solidFill>
@@ -20358,7 +20362,7 @@
               </a:rPr>
               <a:t>URL(Uniform Resource Locator)</a:t>
             </a:r>
-            <a:endParaRPr lang="ko-KR" altLang="en-US" dirty="0">
+            <a:endParaRPr lang="ko-KR" altLang="en-US" sz="1600" dirty="0">
               <a:latin typeface="+mj-lt"/>
             </a:endParaRPr>
           </a:p>
@@ -20378,7 +20382,7 @@
         </p:nvSpPr>
         <p:spPr>
           <a:xfrm>
-            <a:off x="4917300" y="397719"/>
+            <a:off x="183935" y="3090446"/>
             <a:ext cx="6639807" cy="338554"/>
           </a:xfrm>
           <a:prstGeom prst="rect">
@@ -25167,6 +25171,880 @@
     <p:extLst>
       <p:ext uri="{BB962C8B-B14F-4D97-AF65-F5344CB8AC3E}">
         <p14:creationId xmlns:p14="http://schemas.microsoft.com/office/powerpoint/2010/main" val="676225328"/>
+      </p:ext>
+    </p:extLst>
+  </p:cSld>
+  <p:clrMapOvr>
+    <a:masterClrMapping/>
+  </p:clrMapOvr>
+</p:sld>
+</file>
+
+<file path=ppt/slides/slide28.xml><?xml version="1.0" encoding="utf-8"?>
+<p:sld xmlns:a="http://schemas.openxmlformats.org/drawingml/2006/main" xmlns:r="http://schemas.openxmlformats.org/officeDocument/2006/relationships" xmlns:p="http://schemas.openxmlformats.org/presentationml/2006/main">
+  <p:cSld>
+    <p:spTree>
+      <p:nvGrpSpPr>
+        <p:cNvPr id="1" name=""/>
+        <p:cNvGrpSpPr/>
+        <p:nvPr/>
+      </p:nvGrpSpPr>
+      <p:grpSpPr>
+        <a:xfrm>
+          <a:off x="0" y="0"/>
+          <a:ext cx="0" cy="0"/>
+          <a:chOff x="0" y="0"/>
+          <a:chExt cx="0" cy="0"/>
+        </a:xfrm>
+      </p:grpSpPr>
+      <p:sp>
+        <p:nvSpPr>
+          <p:cNvPr id="2" name="직사각형 1">
+            <a:extLst>
+              <a:ext uri="{FF2B5EF4-FFF2-40B4-BE49-F238E27FC236}">
+                <a16:creationId xmlns:a16="http://schemas.microsoft.com/office/drawing/2014/main" id="{DD654FE3-2495-5268-BA03-89C9110740CD}"/>
+              </a:ext>
+            </a:extLst>
+          </p:cNvPr>
+          <p:cNvSpPr/>
+          <p:nvPr/>
+        </p:nvSpPr>
+        <p:spPr>
+          <a:xfrm>
+            <a:off x="2043952" y="2113522"/>
+            <a:ext cx="2528048" cy="717177"/>
+          </a:xfrm>
+          <a:prstGeom prst="rect">
+            <a:avLst/>
+          </a:prstGeom>
+          <a:solidFill>
+            <a:srgbClr val="EFB1FF"/>
+          </a:solidFill>
+          <a:ln>
+            <a:noFill/>
+          </a:ln>
+        </p:spPr>
+        <p:style>
+          <a:lnRef idx="2">
+            <a:schemeClr val="accent1">
+              <a:shade val="50000"/>
+            </a:schemeClr>
+          </a:lnRef>
+          <a:fillRef idx="1">
+            <a:schemeClr val="accent1"/>
+          </a:fillRef>
+          <a:effectRef idx="0">
+            <a:schemeClr val="accent1"/>
+          </a:effectRef>
+          <a:fontRef idx="minor">
+            <a:schemeClr val="lt1"/>
+          </a:fontRef>
+        </p:style>
+        <p:txBody>
+          <a:bodyPr rtlCol="0" anchor="ctr"/>
+          <a:lstStyle/>
+          <a:p>
+            <a:pPr algn="ctr"/>
+            <a:endParaRPr lang="ko-KR" altLang="en-US"/>
+          </a:p>
+        </p:txBody>
+      </p:sp>
+      <p:sp>
+        <p:nvSpPr>
+          <p:cNvPr id="6" name="TextBox 5">
+            <a:extLst>
+              <a:ext uri="{FF2B5EF4-FFF2-40B4-BE49-F238E27FC236}">
+                <a16:creationId xmlns:a16="http://schemas.microsoft.com/office/drawing/2014/main" id="{4F023A94-1853-0585-2DCB-38C9116E5730}"/>
+              </a:ext>
+            </a:extLst>
+          </p:cNvPr>
+          <p:cNvSpPr txBox="1"/>
+          <p:nvPr/>
+        </p:nvSpPr>
+        <p:spPr>
+          <a:xfrm>
+            <a:off x="2209798" y="2302833"/>
+            <a:ext cx="2242000" cy="338554"/>
+          </a:xfrm>
+          <a:prstGeom prst="rect">
+            <a:avLst/>
+          </a:prstGeom>
+          <a:noFill/>
+        </p:spPr>
+        <p:txBody>
+          <a:bodyPr wrap="square" rtlCol="0">
+            <a:spAutoFit/>
+          </a:bodyPr>
+          <a:lstStyle/>
+          <a:p>
+            <a:pPr algn="ctr"/>
+            <a:r>
+              <a:rPr lang="en-US" altLang="ko-KR" sz="1600" dirty="0"/>
+              <a:t>Identity Policy</a:t>
+            </a:r>
+            <a:endParaRPr lang="ko-KR" altLang="en-US" sz="1600" dirty="0"/>
+          </a:p>
+        </p:txBody>
+      </p:sp>
+      <p:sp>
+        <p:nvSpPr>
+          <p:cNvPr id="12" name="직사각형 11">
+            <a:extLst>
+              <a:ext uri="{FF2B5EF4-FFF2-40B4-BE49-F238E27FC236}">
+                <a16:creationId xmlns:a16="http://schemas.microsoft.com/office/drawing/2014/main" id="{D9AE5A68-1303-4696-5A3B-50076AB113D9}"/>
+              </a:ext>
+            </a:extLst>
+          </p:cNvPr>
+          <p:cNvSpPr/>
+          <p:nvPr/>
+        </p:nvSpPr>
+        <p:spPr>
+          <a:xfrm>
+            <a:off x="3567952" y="3795120"/>
+            <a:ext cx="2528048" cy="717177"/>
+          </a:xfrm>
+          <a:prstGeom prst="rect">
+            <a:avLst/>
+          </a:prstGeom>
+          <a:solidFill>
+            <a:srgbClr val="9ADCFF"/>
+          </a:solidFill>
+          <a:ln>
+            <a:noFill/>
+          </a:ln>
+        </p:spPr>
+        <p:style>
+          <a:lnRef idx="2">
+            <a:schemeClr val="accent1">
+              <a:shade val="50000"/>
+            </a:schemeClr>
+          </a:lnRef>
+          <a:fillRef idx="1">
+            <a:schemeClr val="accent1"/>
+          </a:fillRef>
+          <a:effectRef idx="0">
+            <a:schemeClr val="accent1"/>
+          </a:effectRef>
+          <a:fontRef idx="minor">
+            <a:schemeClr val="lt1"/>
+          </a:fontRef>
+        </p:style>
+        <p:txBody>
+          <a:bodyPr rtlCol="0" anchor="ctr"/>
+          <a:lstStyle/>
+          <a:p>
+            <a:pPr algn="ctr"/>
+            <a:endParaRPr lang="ko-KR" altLang="en-US"/>
+          </a:p>
+        </p:txBody>
+      </p:sp>
+      <p:sp>
+        <p:nvSpPr>
+          <p:cNvPr id="13" name="TextBox 12">
+            <a:extLst>
+              <a:ext uri="{FF2B5EF4-FFF2-40B4-BE49-F238E27FC236}">
+                <a16:creationId xmlns:a16="http://schemas.microsoft.com/office/drawing/2014/main" id="{5BE3E037-B4A9-7F91-C2C9-AFF2F22A0085}"/>
+              </a:ext>
+            </a:extLst>
+          </p:cNvPr>
+          <p:cNvSpPr txBox="1"/>
+          <p:nvPr/>
+        </p:nvSpPr>
+        <p:spPr>
+          <a:xfrm>
+            <a:off x="3733798" y="3984431"/>
+            <a:ext cx="2242000" cy="338554"/>
+          </a:xfrm>
+          <a:prstGeom prst="rect">
+            <a:avLst/>
+          </a:prstGeom>
+          <a:noFill/>
+        </p:spPr>
+        <p:txBody>
+          <a:bodyPr wrap="square" rtlCol="0">
+            <a:spAutoFit/>
+          </a:bodyPr>
+          <a:lstStyle/>
+          <a:p>
+            <a:pPr algn="ctr"/>
+            <a:r>
+              <a:rPr lang="en-US" altLang="ko-KR" sz="1600" dirty="0"/>
+              <a:t>Identity Role</a:t>
+            </a:r>
+            <a:endParaRPr lang="ko-KR" altLang="en-US" sz="1600" dirty="0"/>
+          </a:p>
+        </p:txBody>
+      </p:sp>
+      <p:sp>
+        <p:nvSpPr>
+          <p:cNvPr id="14" name="직사각형 13">
+            <a:extLst>
+              <a:ext uri="{FF2B5EF4-FFF2-40B4-BE49-F238E27FC236}">
+                <a16:creationId xmlns:a16="http://schemas.microsoft.com/office/drawing/2014/main" id="{25A662DC-93EE-30C5-CD4D-3470723D1A2D}"/>
+              </a:ext>
+            </a:extLst>
+          </p:cNvPr>
+          <p:cNvSpPr/>
+          <p:nvPr/>
+        </p:nvSpPr>
+        <p:spPr>
+          <a:xfrm>
+            <a:off x="3567953" y="5118129"/>
+            <a:ext cx="2528048" cy="717177"/>
+          </a:xfrm>
+          <a:prstGeom prst="rect">
+            <a:avLst/>
+          </a:prstGeom>
+          <a:solidFill>
+            <a:srgbClr val="9999FF"/>
+          </a:solidFill>
+          <a:ln>
+            <a:noFill/>
+          </a:ln>
+        </p:spPr>
+        <p:style>
+          <a:lnRef idx="2">
+            <a:schemeClr val="accent1">
+              <a:shade val="50000"/>
+            </a:schemeClr>
+          </a:lnRef>
+          <a:fillRef idx="1">
+            <a:schemeClr val="accent1"/>
+          </a:fillRef>
+          <a:effectRef idx="0">
+            <a:schemeClr val="accent1"/>
+          </a:effectRef>
+          <a:fontRef idx="minor">
+            <a:schemeClr val="lt1"/>
+          </a:fontRef>
+        </p:style>
+        <p:txBody>
+          <a:bodyPr rtlCol="0" anchor="ctr"/>
+          <a:lstStyle/>
+          <a:p>
+            <a:pPr algn="ctr"/>
+            <a:endParaRPr lang="ko-KR" altLang="en-US"/>
+          </a:p>
+        </p:txBody>
+      </p:sp>
+      <p:sp>
+        <p:nvSpPr>
+          <p:cNvPr id="15" name="TextBox 14">
+            <a:extLst>
+              <a:ext uri="{FF2B5EF4-FFF2-40B4-BE49-F238E27FC236}">
+                <a16:creationId xmlns:a16="http://schemas.microsoft.com/office/drawing/2014/main" id="{8ECA2F1E-E5DC-0C72-ADE2-74A826050AD8}"/>
+              </a:ext>
+            </a:extLst>
+          </p:cNvPr>
+          <p:cNvSpPr txBox="1"/>
+          <p:nvPr/>
+        </p:nvSpPr>
+        <p:spPr>
+          <a:xfrm>
+            <a:off x="3733799" y="5307440"/>
+            <a:ext cx="2242000" cy="338554"/>
+          </a:xfrm>
+          <a:prstGeom prst="rect">
+            <a:avLst/>
+          </a:prstGeom>
+          <a:noFill/>
+        </p:spPr>
+        <p:txBody>
+          <a:bodyPr wrap="square" rtlCol="0">
+            <a:spAutoFit/>
+          </a:bodyPr>
+          <a:lstStyle/>
+          <a:p>
+            <a:pPr algn="ctr"/>
+            <a:r>
+              <a:rPr lang="en-US" altLang="ko-KR" sz="1600" dirty="0"/>
+              <a:t>Identity Claim By Role</a:t>
+            </a:r>
+            <a:endParaRPr lang="ko-KR" altLang="en-US" sz="1600" dirty="0"/>
+          </a:p>
+        </p:txBody>
+      </p:sp>
+      <p:sp>
+        <p:nvSpPr>
+          <p:cNvPr id="16" name="직사각형 15">
+            <a:extLst>
+              <a:ext uri="{FF2B5EF4-FFF2-40B4-BE49-F238E27FC236}">
+                <a16:creationId xmlns:a16="http://schemas.microsoft.com/office/drawing/2014/main" id="{25E1CE89-79E5-55DC-10FF-91792833DDFA}"/>
+              </a:ext>
+            </a:extLst>
+          </p:cNvPr>
+          <p:cNvSpPr/>
+          <p:nvPr/>
+        </p:nvSpPr>
+        <p:spPr>
+          <a:xfrm>
+            <a:off x="573740" y="3795120"/>
+            <a:ext cx="2528048" cy="717177"/>
+          </a:xfrm>
+          <a:prstGeom prst="rect">
+            <a:avLst/>
+          </a:prstGeom>
+          <a:solidFill>
+            <a:srgbClr val="9ADCFF"/>
+          </a:solidFill>
+          <a:ln>
+            <a:noFill/>
+          </a:ln>
+        </p:spPr>
+        <p:style>
+          <a:lnRef idx="2">
+            <a:schemeClr val="accent1">
+              <a:shade val="50000"/>
+            </a:schemeClr>
+          </a:lnRef>
+          <a:fillRef idx="1">
+            <a:schemeClr val="accent1"/>
+          </a:fillRef>
+          <a:effectRef idx="0">
+            <a:schemeClr val="accent1"/>
+          </a:effectRef>
+          <a:fontRef idx="minor">
+            <a:schemeClr val="lt1"/>
+          </a:fontRef>
+        </p:style>
+        <p:txBody>
+          <a:bodyPr rtlCol="0" anchor="ctr"/>
+          <a:lstStyle/>
+          <a:p>
+            <a:pPr algn="ctr"/>
+            <a:endParaRPr lang="ko-KR" altLang="en-US"/>
+          </a:p>
+        </p:txBody>
+      </p:sp>
+      <p:sp>
+        <p:nvSpPr>
+          <p:cNvPr id="17" name="TextBox 16">
+            <a:extLst>
+              <a:ext uri="{FF2B5EF4-FFF2-40B4-BE49-F238E27FC236}">
+                <a16:creationId xmlns:a16="http://schemas.microsoft.com/office/drawing/2014/main" id="{72E3E535-DC66-00D6-6ED9-B0E9969C405C}"/>
+              </a:ext>
+            </a:extLst>
+          </p:cNvPr>
+          <p:cNvSpPr txBox="1"/>
+          <p:nvPr/>
+        </p:nvSpPr>
+        <p:spPr>
+          <a:xfrm>
+            <a:off x="739586" y="3984431"/>
+            <a:ext cx="2242000" cy="338554"/>
+          </a:xfrm>
+          <a:prstGeom prst="rect">
+            <a:avLst/>
+          </a:prstGeom>
+          <a:noFill/>
+        </p:spPr>
+        <p:txBody>
+          <a:bodyPr wrap="square" rtlCol="0">
+            <a:spAutoFit/>
+          </a:bodyPr>
+          <a:lstStyle/>
+          <a:p>
+            <a:pPr algn="ctr"/>
+            <a:r>
+              <a:rPr lang="en-US" altLang="ko-KR" sz="1600" dirty="0"/>
+              <a:t>Identity Claim</a:t>
+            </a:r>
+            <a:endParaRPr lang="ko-KR" altLang="en-US" sz="1600" dirty="0"/>
+          </a:p>
+        </p:txBody>
+      </p:sp>
+      <p:cxnSp>
+        <p:nvCxnSpPr>
+          <p:cNvPr id="19" name="연결선: 꺾임 18">
+            <a:extLst>
+              <a:ext uri="{FF2B5EF4-FFF2-40B4-BE49-F238E27FC236}">
+                <a16:creationId xmlns:a16="http://schemas.microsoft.com/office/drawing/2014/main" id="{C49710D9-2468-B576-33F9-6360ED3BD328}"/>
+              </a:ext>
+            </a:extLst>
+          </p:cNvPr>
+          <p:cNvCxnSpPr>
+            <a:stCxn id="2" idx="2"/>
+            <a:endCxn id="16" idx="0"/>
+          </p:cNvCxnSpPr>
+          <p:nvPr/>
+        </p:nvCxnSpPr>
+        <p:spPr>
+          <a:xfrm rot="5400000">
+            <a:off x="2090660" y="2577803"/>
+            <a:ext cx="964421" cy="1470212"/>
+          </a:xfrm>
+          <a:prstGeom prst="bentConnector3">
+            <a:avLst/>
+          </a:prstGeom>
+          <a:ln w="38100">
+            <a:solidFill>
+              <a:srgbClr val="FF0000"/>
+            </a:solidFill>
+            <a:tailEnd type="triangle"/>
+          </a:ln>
+        </p:spPr>
+        <p:style>
+          <a:lnRef idx="1">
+            <a:schemeClr val="accent1"/>
+          </a:lnRef>
+          <a:fillRef idx="0">
+            <a:schemeClr val="accent1"/>
+          </a:fillRef>
+          <a:effectRef idx="0">
+            <a:schemeClr val="accent1"/>
+          </a:effectRef>
+          <a:fontRef idx="minor">
+            <a:schemeClr val="tx1"/>
+          </a:fontRef>
+        </p:style>
+      </p:cxnSp>
+      <p:cxnSp>
+        <p:nvCxnSpPr>
+          <p:cNvPr id="20" name="연결선: 꺾임 19">
+            <a:extLst>
+              <a:ext uri="{FF2B5EF4-FFF2-40B4-BE49-F238E27FC236}">
+                <a16:creationId xmlns:a16="http://schemas.microsoft.com/office/drawing/2014/main" id="{888A13D6-B813-F986-B06C-884A5E2D62AB}"/>
+              </a:ext>
+            </a:extLst>
+          </p:cNvPr>
+          <p:cNvCxnSpPr>
+            <a:cxnSpLocks/>
+            <a:stCxn id="2" idx="2"/>
+            <a:endCxn id="12" idx="0"/>
+          </p:cNvCxnSpPr>
+          <p:nvPr/>
+        </p:nvCxnSpPr>
+        <p:spPr>
+          <a:xfrm rot="16200000" flipH="1">
+            <a:off x="3587766" y="2550909"/>
+            <a:ext cx="964421" cy="1524000"/>
+          </a:xfrm>
+          <a:prstGeom prst="bentConnector3">
+            <a:avLst>
+              <a:gd name="adj1" fmla="val 50000"/>
+            </a:avLst>
+          </a:prstGeom>
+          <a:ln w="38100">
+            <a:solidFill>
+              <a:srgbClr val="FF0000"/>
+            </a:solidFill>
+            <a:tailEnd type="triangle"/>
+          </a:ln>
+        </p:spPr>
+        <p:style>
+          <a:lnRef idx="1">
+            <a:schemeClr val="accent1"/>
+          </a:lnRef>
+          <a:fillRef idx="0">
+            <a:schemeClr val="accent1"/>
+          </a:fillRef>
+          <a:effectRef idx="0">
+            <a:schemeClr val="accent1"/>
+          </a:effectRef>
+          <a:fontRef idx="minor">
+            <a:schemeClr val="tx1"/>
+          </a:fontRef>
+        </p:style>
+      </p:cxnSp>
+      <p:cxnSp>
+        <p:nvCxnSpPr>
+          <p:cNvPr id="28" name="직선 화살표 연결선 27">
+            <a:extLst>
+              <a:ext uri="{FF2B5EF4-FFF2-40B4-BE49-F238E27FC236}">
+                <a16:creationId xmlns:a16="http://schemas.microsoft.com/office/drawing/2014/main" id="{2CAAFEBD-879A-1851-74D0-BB62C80BF98C}"/>
+              </a:ext>
+            </a:extLst>
+          </p:cNvPr>
+          <p:cNvCxnSpPr>
+            <a:cxnSpLocks/>
+            <a:stCxn id="12" idx="2"/>
+            <a:endCxn id="14" idx="0"/>
+          </p:cNvCxnSpPr>
+          <p:nvPr/>
+        </p:nvCxnSpPr>
+        <p:spPr>
+          <a:xfrm>
+            <a:off x="4831976" y="4512297"/>
+            <a:ext cx="1" cy="605832"/>
+          </a:xfrm>
+          <a:prstGeom prst="straightConnector1">
+            <a:avLst/>
+          </a:prstGeom>
+          <a:ln w="38100">
+            <a:solidFill>
+              <a:srgbClr val="FF0000"/>
+            </a:solidFill>
+            <a:tailEnd type="triangle"/>
+          </a:ln>
+        </p:spPr>
+        <p:style>
+          <a:lnRef idx="1">
+            <a:schemeClr val="accent1"/>
+          </a:lnRef>
+          <a:fillRef idx="0">
+            <a:schemeClr val="accent1"/>
+          </a:fillRef>
+          <a:effectRef idx="0">
+            <a:schemeClr val="accent1"/>
+          </a:effectRef>
+          <a:fontRef idx="minor">
+            <a:schemeClr val="tx1"/>
+          </a:fontRef>
+        </p:style>
+      </p:cxnSp>
+      <p:sp>
+        <p:nvSpPr>
+          <p:cNvPr id="32" name="TextBox 31">
+            <a:extLst>
+              <a:ext uri="{FF2B5EF4-FFF2-40B4-BE49-F238E27FC236}">
+                <a16:creationId xmlns:a16="http://schemas.microsoft.com/office/drawing/2014/main" id="{088B4F1B-6436-1EBC-946E-086E96BC12CC}"/>
+              </a:ext>
+            </a:extLst>
+          </p:cNvPr>
+          <p:cNvSpPr txBox="1"/>
+          <p:nvPr/>
+        </p:nvSpPr>
+        <p:spPr>
+          <a:xfrm>
+            <a:off x="6261846" y="3999819"/>
+            <a:ext cx="2528048" cy="307777"/>
+          </a:xfrm>
+          <a:prstGeom prst="rect">
+            <a:avLst/>
+          </a:prstGeom>
+          <a:noFill/>
+        </p:spPr>
+        <p:txBody>
+          <a:bodyPr wrap="square" rtlCol="0">
+            <a:spAutoFit/>
+          </a:bodyPr>
+          <a:lstStyle/>
+          <a:p>
+            <a:r>
+              <a:rPr lang="ko-KR" altLang="en-US" sz="1400" dirty="0"/>
+              <a:t>권한</a:t>
+            </a:r>
+            <a:r>
+              <a:rPr lang="en-US" altLang="ko-KR" sz="1400" dirty="0"/>
+              <a:t>(Role)</a:t>
+            </a:r>
+            <a:r>
+              <a:rPr lang="ko-KR" altLang="en-US" sz="1400" dirty="0"/>
+              <a:t> </a:t>
+            </a:r>
+            <a:r>
+              <a:rPr lang="en-US" altLang="ko-KR" sz="1400" dirty="0"/>
+              <a:t>– Ex. </a:t>
+            </a:r>
+            <a:r>
+              <a:rPr lang="ko-KR" altLang="en-US" sz="1400" dirty="0"/>
+              <a:t>개발팀 팀원</a:t>
+            </a:r>
+          </a:p>
+        </p:txBody>
+      </p:sp>
+      <p:sp>
+        <p:nvSpPr>
+          <p:cNvPr id="33" name="TextBox 32">
+            <a:extLst>
+              <a:ext uri="{FF2B5EF4-FFF2-40B4-BE49-F238E27FC236}">
+                <a16:creationId xmlns:a16="http://schemas.microsoft.com/office/drawing/2014/main" id="{E28B8F44-E4A0-3C4D-26B1-38D8283F6295}"/>
+              </a:ext>
+            </a:extLst>
+          </p:cNvPr>
+          <p:cNvSpPr txBox="1"/>
+          <p:nvPr/>
+        </p:nvSpPr>
+        <p:spPr>
+          <a:xfrm>
+            <a:off x="6261847" y="5322828"/>
+            <a:ext cx="3688976" cy="307777"/>
+          </a:xfrm>
+          <a:prstGeom prst="rect">
+            <a:avLst/>
+          </a:prstGeom>
+          <a:noFill/>
+        </p:spPr>
+        <p:txBody>
+          <a:bodyPr wrap="square" rtlCol="0">
+            <a:spAutoFit/>
+          </a:bodyPr>
+          <a:lstStyle/>
+          <a:p>
+            <a:r>
+              <a:rPr lang="ko-KR" altLang="en-US" sz="1400" dirty="0"/>
+              <a:t>권한 별 역할 </a:t>
+            </a:r>
+            <a:r>
+              <a:rPr lang="en-US" altLang="ko-KR" sz="1400" dirty="0"/>
+              <a:t>(Claim)</a:t>
+            </a:r>
+            <a:r>
+              <a:rPr lang="ko-KR" altLang="en-US" sz="1400" dirty="0"/>
+              <a:t> </a:t>
+            </a:r>
+            <a:r>
+              <a:rPr lang="en-US" altLang="ko-KR" sz="1400" dirty="0"/>
+              <a:t>– Ex. Back-End </a:t>
+            </a:r>
+            <a:r>
+              <a:rPr lang="ko-KR" altLang="en-US" sz="1400" dirty="0"/>
+              <a:t>개발자</a:t>
+            </a:r>
+          </a:p>
+        </p:txBody>
+      </p:sp>
+      <p:sp>
+        <p:nvSpPr>
+          <p:cNvPr id="36" name="직사각형 35">
+            <a:extLst>
+              <a:ext uri="{FF2B5EF4-FFF2-40B4-BE49-F238E27FC236}">
+                <a16:creationId xmlns:a16="http://schemas.microsoft.com/office/drawing/2014/main" id="{75418CEF-2C83-9A7D-9D4F-B65EBF6A8AFD}"/>
+              </a:ext>
+            </a:extLst>
+          </p:cNvPr>
+          <p:cNvSpPr/>
+          <p:nvPr/>
+        </p:nvSpPr>
+        <p:spPr>
+          <a:xfrm>
+            <a:off x="2043952" y="943101"/>
+            <a:ext cx="2528048" cy="717177"/>
+          </a:xfrm>
+          <a:prstGeom prst="rect">
+            <a:avLst/>
+          </a:prstGeom>
+          <a:solidFill>
+            <a:srgbClr val="FFD966"/>
+          </a:solidFill>
+          <a:ln>
+            <a:noFill/>
+          </a:ln>
+        </p:spPr>
+        <p:style>
+          <a:lnRef idx="2">
+            <a:schemeClr val="accent1">
+              <a:shade val="50000"/>
+            </a:schemeClr>
+          </a:lnRef>
+          <a:fillRef idx="1">
+            <a:schemeClr val="accent1"/>
+          </a:fillRef>
+          <a:effectRef idx="0">
+            <a:schemeClr val="accent1"/>
+          </a:effectRef>
+          <a:fontRef idx="minor">
+            <a:schemeClr val="lt1"/>
+          </a:fontRef>
+        </p:style>
+        <p:txBody>
+          <a:bodyPr rtlCol="0" anchor="ctr"/>
+          <a:lstStyle/>
+          <a:p>
+            <a:pPr algn="ctr"/>
+            <a:endParaRPr lang="ko-KR" altLang="en-US"/>
+          </a:p>
+        </p:txBody>
+      </p:sp>
+      <p:sp>
+        <p:nvSpPr>
+          <p:cNvPr id="37" name="TextBox 36">
+            <a:extLst>
+              <a:ext uri="{FF2B5EF4-FFF2-40B4-BE49-F238E27FC236}">
+                <a16:creationId xmlns:a16="http://schemas.microsoft.com/office/drawing/2014/main" id="{F1755EA7-C760-FCAC-B73B-8A629C2A6CCA}"/>
+              </a:ext>
+            </a:extLst>
+          </p:cNvPr>
+          <p:cNvSpPr txBox="1"/>
+          <p:nvPr/>
+        </p:nvSpPr>
+        <p:spPr>
+          <a:xfrm>
+            <a:off x="2209798" y="1132412"/>
+            <a:ext cx="2242000" cy="338554"/>
+          </a:xfrm>
+          <a:prstGeom prst="rect">
+            <a:avLst/>
+          </a:prstGeom>
+          <a:noFill/>
+        </p:spPr>
+        <p:txBody>
+          <a:bodyPr wrap="square" rtlCol="0">
+            <a:spAutoFit/>
+          </a:bodyPr>
+          <a:lstStyle/>
+          <a:p>
+            <a:pPr algn="ctr"/>
+            <a:r>
+              <a:rPr lang="en-US" altLang="ko-KR" sz="1600" dirty="0"/>
+              <a:t>ASP.NET Core Identity</a:t>
+            </a:r>
+            <a:endParaRPr lang="ko-KR" altLang="en-US" sz="1600" dirty="0"/>
+          </a:p>
+        </p:txBody>
+      </p:sp>
+      <p:cxnSp>
+        <p:nvCxnSpPr>
+          <p:cNvPr id="38" name="직선 화살표 연결선 37">
+            <a:extLst>
+              <a:ext uri="{FF2B5EF4-FFF2-40B4-BE49-F238E27FC236}">
+                <a16:creationId xmlns:a16="http://schemas.microsoft.com/office/drawing/2014/main" id="{6D359125-E580-8810-D29A-83A4BEF4BE2A}"/>
+              </a:ext>
+            </a:extLst>
+          </p:cNvPr>
+          <p:cNvCxnSpPr>
+            <a:cxnSpLocks/>
+            <a:stCxn id="36" idx="2"/>
+            <a:endCxn id="2" idx="0"/>
+          </p:cNvCxnSpPr>
+          <p:nvPr/>
+        </p:nvCxnSpPr>
+        <p:spPr>
+          <a:xfrm>
+            <a:off x="3307976" y="1660278"/>
+            <a:ext cx="0" cy="453244"/>
+          </a:xfrm>
+          <a:prstGeom prst="straightConnector1">
+            <a:avLst/>
+          </a:prstGeom>
+          <a:ln w="38100">
+            <a:solidFill>
+              <a:srgbClr val="FF0000"/>
+            </a:solidFill>
+            <a:tailEnd type="triangle"/>
+          </a:ln>
+        </p:spPr>
+        <p:style>
+          <a:lnRef idx="1">
+            <a:schemeClr val="accent1"/>
+          </a:lnRef>
+          <a:fillRef idx="0">
+            <a:schemeClr val="accent1"/>
+          </a:fillRef>
+          <a:effectRef idx="0">
+            <a:schemeClr val="accent1"/>
+          </a:effectRef>
+          <a:fontRef idx="minor">
+            <a:schemeClr val="tx1"/>
+          </a:fontRef>
+        </p:style>
+      </p:cxnSp>
+      <p:sp>
+        <p:nvSpPr>
+          <p:cNvPr id="41" name="TextBox 40">
+            <a:extLst>
+              <a:ext uri="{FF2B5EF4-FFF2-40B4-BE49-F238E27FC236}">
+                <a16:creationId xmlns:a16="http://schemas.microsoft.com/office/drawing/2014/main" id="{9A5D60FA-0223-6242-C9F2-C9B50E7E6B17}"/>
+              </a:ext>
+            </a:extLst>
+          </p:cNvPr>
+          <p:cNvSpPr txBox="1"/>
+          <p:nvPr/>
+        </p:nvSpPr>
+        <p:spPr>
+          <a:xfrm>
+            <a:off x="4617644" y="2318221"/>
+            <a:ext cx="1202094" cy="307777"/>
+          </a:xfrm>
+          <a:prstGeom prst="rect">
+            <a:avLst/>
+          </a:prstGeom>
+          <a:noFill/>
+        </p:spPr>
+        <p:txBody>
+          <a:bodyPr wrap="square" rtlCol="0">
+            <a:spAutoFit/>
+          </a:bodyPr>
+          <a:lstStyle/>
+          <a:p>
+            <a:r>
+              <a:rPr lang="ko-KR" altLang="en-US" sz="1400" dirty="0"/>
+              <a:t>정책</a:t>
+            </a:r>
+            <a:r>
+              <a:rPr lang="en-US" altLang="ko-KR" sz="1400" dirty="0"/>
+              <a:t>(Policy)</a:t>
+            </a:r>
+            <a:endParaRPr lang="ko-KR" altLang="en-US" sz="1400" dirty="0"/>
+          </a:p>
+        </p:txBody>
+      </p:sp>
+      <p:sp>
+        <p:nvSpPr>
+          <p:cNvPr id="43" name="TextBox 42">
+            <a:extLst>
+              <a:ext uri="{FF2B5EF4-FFF2-40B4-BE49-F238E27FC236}">
+                <a16:creationId xmlns:a16="http://schemas.microsoft.com/office/drawing/2014/main" id="{0FDD54A7-AE70-38BB-5A42-305F000DB963}"/>
+              </a:ext>
+            </a:extLst>
+          </p:cNvPr>
+          <p:cNvSpPr txBox="1"/>
+          <p:nvPr/>
+        </p:nvSpPr>
+        <p:spPr>
+          <a:xfrm>
+            <a:off x="5819739" y="2174055"/>
+            <a:ext cx="2865046" cy="307777"/>
+          </a:xfrm>
+          <a:prstGeom prst="rect">
+            <a:avLst/>
+          </a:prstGeom>
+          <a:noFill/>
+        </p:spPr>
+        <p:txBody>
+          <a:bodyPr wrap="square">
+            <a:spAutoFit/>
+          </a:bodyPr>
+          <a:lstStyle/>
+          <a:p>
+            <a:r>
+              <a:rPr lang="en-US" altLang="ko-KR" sz="1400" dirty="0"/>
+              <a:t>Policy(Role 1, Role 2, …Role N)</a:t>
+            </a:r>
+            <a:endParaRPr lang="ko-KR" altLang="en-US" sz="1400" dirty="0"/>
+          </a:p>
+        </p:txBody>
+      </p:sp>
+      <p:sp>
+        <p:nvSpPr>
+          <p:cNvPr id="44" name="TextBox 43">
+            <a:extLst>
+              <a:ext uri="{FF2B5EF4-FFF2-40B4-BE49-F238E27FC236}">
+                <a16:creationId xmlns:a16="http://schemas.microsoft.com/office/drawing/2014/main" id="{0C33179A-4336-BB7C-CD20-7FECA3CD0EDD}"/>
+              </a:ext>
+            </a:extLst>
+          </p:cNvPr>
+          <p:cNvSpPr txBox="1"/>
+          <p:nvPr/>
+        </p:nvSpPr>
+        <p:spPr>
+          <a:xfrm>
+            <a:off x="5819738" y="2472109"/>
+            <a:ext cx="3192257" cy="307777"/>
+          </a:xfrm>
+          <a:prstGeom prst="rect">
+            <a:avLst/>
+          </a:prstGeom>
+          <a:noFill/>
+        </p:spPr>
+        <p:txBody>
+          <a:bodyPr wrap="square">
+            <a:spAutoFit/>
+          </a:bodyPr>
+          <a:lstStyle/>
+          <a:p>
+            <a:r>
+              <a:rPr lang="en-US" altLang="ko-KR" sz="1400" dirty="0"/>
+              <a:t>Policy(Claim 1, Claim 2, … Claim N)</a:t>
+            </a:r>
+            <a:endParaRPr lang="ko-KR" altLang="en-US" sz="1400" dirty="0"/>
+          </a:p>
+        </p:txBody>
+      </p:sp>
+    </p:spTree>
+    <p:extLst>
+      <p:ext uri="{BB962C8B-B14F-4D97-AF65-F5344CB8AC3E}">
+        <p14:creationId xmlns:p14="http://schemas.microsoft.com/office/powerpoint/2010/main" val="2327124629"/>
       </p:ext>
     </p:extLst>
   </p:cSld>
@@ -40544,6 +41422,29 @@
         </a:fontRef>
       </a:style>
     </a:spDef>
+    <a:lnDef>
+      <a:spPr>
+        <a:ln w="38100">
+          <a:tailEnd type="triangle"/>
+        </a:ln>
+      </a:spPr>
+      <a:bodyPr/>
+      <a:lstStyle/>
+      <a:style>
+        <a:lnRef idx="1">
+          <a:schemeClr val="accent1"/>
+        </a:lnRef>
+        <a:fillRef idx="0">
+          <a:schemeClr val="accent1"/>
+        </a:fillRef>
+        <a:effectRef idx="0">
+          <a:schemeClr val="accent1"/>
+        </a:effectRef>
+        <a:fontRef idx="minor">
+          <a:schemeClr val="tx1"/>
+        </a:fontRef>
+      </a:style>
+    </a:lnDef>
   </a:objectDefaults>
   <a:extraClrSchemeLst/>
   <a:extLst>

</xml_diff>

<commit_message>
ASP.Net Core Entityframework Core 다이어그램 추가.
</commit_message>
<xml_diff>
--- a/Image/Diagram/Canvas.pptx
+++ b/Image/Diagram/Canvas.pptx
@@ -5,10 +5,10 @@
     <p:sldMasterId id="2147483648" r:id="rId1"/>
   </p:sldMasterIdLst>
   <p:notesMasterIdLst>
-    <p:notesMasterId r:id="rId32"/>
+    <p:notesMasterId r:id="rId33"/>
   </p:notesMasterIdLst>
   <p:handoutMasterIdLst>
-    <p:handoutMasterId r:id="rId33"/>
+    <p:handoutMasterId r:id="rId34"/>
   </p:handoutMasterIdLst>
   <p:sldIdLst>
     <p:sldId id="278" r:id="rId2"/>
@@ -41,6 +41,7 @@
     <p:sldId id="284" r:id="rId29"/>
     <p:sldId id="286" r:id="rId30"/>
     <p:sldId id="285" r:id="rId31"/>
+    <p:sldId id="287" r:id="rId32"/>
   </p:sldIdLst>
   <p:sldSz cx="12192000" cy="6858000"/>
   <p:notesSz cx="6858000" cy="9144000"/>
@@ -244,7 +245,7 @@
           <a:p>
             <a:fld id="{29F43AEA-EBFF-4648-88A2-B3AE8909EBED}" type="datetimeFigureOut">
               <a:rPr lang="ko-KR" altLang="en-US" smtClean="0"/>
-              <a:t>2022-09-28</a:t>
+              <a:t>2022-09-30</a:t>
             </a:fld>
             <a:endParaRPr lang="ko-KR" altLang="en-US"/>
           </a:p>
@@ -421,7 +422,7 @@
           <a:p>
             <a:fld id="{D4F45FAA-3284-44C8-A10C-F89E7A7A9D0D}" type="datetimeFigureOut">
               <a:rPr lang="ko-KR" altLang="en-US" smtClean="0"/>
-              <a:t>2022-09-28</a:t>
+              <a:t>2022-09-30</a:t>
             </a:fld>
             <a:endParaRPr lang="ko-KR" altLang="en-US"/>
           </a:p>
@@ -817,7 +818,7 @@
           <a:p>
             <a:fld id="{B5FEAD0D-239A-466E-9319-07628EC22FD2}" type="datetimeFigureOut">
               <a:rPr lang="ko-KR" altLang="en-US" smtClean="0"/>
-              <a:t>2022-09-28</a:t>
+              <a:t>2022-09-30</a:t>
             </a:fld>
             <a:endParaRPr lang="ko-KR" altLang="en-US"/>
           </a:p>
@@ -985,7 +986,7 @@
           <a:p>
             <a:fld id="{B5FEAD0D-239A-466E-9319-07628EC22FD2}" type="datetimeFigureOut">
               <a:rPr lang="ko-KR" altLang="en-US" smtClean="0"/>
-              <a:t>2022-09-28</a:t>
+              <a:t>2022-09-30</a:t>
             </a:fld>
             <a:endParaRPr lang="ko-KR" altLang="en-US"/>
           </a:p>
@@ -1163,7 +1164,7 @@
           <a:p>
             <a:fld id="{B5FEAD0D-239A-466E-9319-07628EC22FD2}" type="datetimeFigureOut">
               <a:rPr lang="ko-KR" altLang="en-US" smtClean="0"/>
-              <a:t>2022-09-28</a:t>
+              <a:t>2022-09-30</a:t>
             </a:fld>
             <a:endParaRPr lang="ko-KR" altLang="en-US"/>
           </a:p>
@@ -1258,7 +1259,7 @@
           <a:p>
             <a:fld id="{B5FEAD0D-239A-466E-9319-07628EC22FD2}" type="datetimeFigureOut">
               <a:rPr lang="ko-KR" altLang="en-US" smtClean="0"/>
-              <a:t>2022-09-28</a:t>
+              <a:t>2022-09-30</a:t>
             </a:fld>
             <a:endParaRPr lang="ko-KR" altLang="en-US"/>
           </a:p>
@@ -1503,7 +1504,7 @@
           <a:p>
             <a:fld id="{B5FEAD0D-239A-466E-9319-07628EC22FD2}" type="datetimeFigureOut">
               <a:rPr lang="ko-KR" altLang="en-US" smtClean="0"/>
-              <a:t>2022-09-28</a:t>
+              <a:t>2022-09-30</a:t>
             </a:fld>
             <a:endParaRPr lang="ko-KR" altLang="en-US"/>
           </a:p>
@@ -1732,7 +1733,7 @@
           <a:p>
             <a:fld id="{B5FEAD0D-239A-466E-9319-07628EC22FD2}" type="datetimeFigureOut">
               <a:rPr lang="ko-KR" altLang="en-US" smtClean="0"/>
-              <a:t>2022-09-28</a:t>
+              <a:t>2022-09-30</a:t>
             </a:fld>
             <a:endParaRPr lang="ko-KR" altLang="en-US"/>
           </a:p>
@@ -2096,7 +2097,7 @@
           <a:p>
             <a:fld id="{B5FEAD0D-239A-466E-9319-07628EC22FD2}" type="datetimeFigureOut">
               <a:rPr lang="ko-KR" altLang="en-US" smtClean="0"/>
-              <a:t>2022-09-28</a:t>
+              <a:t>2022-09-30</a:t>
             </a:fld>
             <a:endParaRPr lang="ko-KR" altLang="en-US"/>
           </a:p>
@@ -2213,7 +2214,7 @@
           <a:p>
             <a:fld id="{B5FEAD0D-239A-466E-9319-07628EC22FD2}" type="datetimeFigureOut">
               <a:rPr lang="ko-KR" altLang="en-US" smtClean="0"/>
-              <a:t>2022-09-28</a:t>
+              <a:t>2022-09-30</a:t>
             </a:fld>
             <a:endParaRPr lang="ko-KR" altLang="en-US"/>
           </a:p>
@@ -2308,7 +2309,7 @@
           <a:p>
             <a:fld id="{B5FEAD0D-239A-466E-9319-07628EC22FD2}" type="datetimeFigureOut">
               <a:rPr lang="ko-KR" altLang="en-US" smtClean="0"/>
-              <a:t>2022-09-28</a:t>
+              <a:t>2022-09-30</a:t>
             </a:fld>
             <a:endParaRPr lang="ko-KR" altLang="en-US"/>
           </a:p>
@@ -2583,7 +2584,7 @@
           <a:p>
             <a:fld id="{B5FEAD0D-239A-466E-9319-07628EC22FD2}" type="datetimeFigureOut">
               <a:rPr lang="ko-KR" altLang="en-US" smtClean="0"/>
-              <a:t>2022-09-28</a:t>
+              <a:t>2022-09-30</a:t>
             </a:fld>
             <a:endParaRPr lang="ko-KR" altLang="en-US"/>
           </a:p>
@@ -2835,7 +2836,7 @@
           <a:p>
             <a:fld id="{B5FEAD0D-239A-466E-9319-07628EC22FD2}" type="datetimeFigureOut">
               <a:rPr lang="ko-KR" altLang="en-US" smtClean="0"/>
-              <a:t>2022-09-28</a:t>
+              <a:t>2022-09-30</a:t>
             </a:fld>
             <a:endParaRPr lang="ko-KR" altLang="en-US"/>
           </a:p>
@@ -3046,7 +3047,7 @@
           <a:p>
             <a:fld id="{B5FEAD0D-239A-466E-9319-07628EC22FD2}" type="datetimeFigureOut">
               <a:rPr lang="ko-KR" altLang="en-US" smtClean="0"/>
-              <a:t>2022-09-28</a:t>
+              <a:t>2022-09-30</a:t>
             </a:fld>
             <a:endParaRPr lang="ko-KR" altLang="en-US"/>
           </a:p>
@@ -33148,6 +33149,865 @@
     <p:extLst>
       <p:ext uri="{BB962C8B-B14F-4D97-AF65-F5344CB8AC3E}">
         <p14:creationId xmlns:p14="http://schemas.microsoft.com/office/powerpoint/2010/main" val="3249100903"/>
+      </p:ext>
+    </p:extLst>
+  </p:cSld>
+  <p:clrMapOvr>
+    <a:masterClrMapping/>
+  </p:clrMapOvr>
+</p:sld>
+</file>
+
+<file path=ppt/slides/slide31.xml><?xml version="1.0" encoding="utf-8"?>
+<p:sld xmlns:a="http://schemas.openxmlformats.org/drawingml/2006/main" xmlns:r="http://schemas.openxmlformats.org/officeDocument/2006/relationships" xmlns:p="http://schemas.openxmlformats.org/presentationml/2006/main">
+  <p:cSld>
+    <p:spTree>
+      <p:nvGrpSpPr>
+        <p:cNvPr id="1" name=""/>
+        <p:cNvGrpSpPr/>
+        <p:nvPr/>
+      </p:nvGrpSpPr>
+      <p:grpSpPr>
+        <a:xfrm>
+          <a:off x="0" y="0"/>
+          <a:ext cx="0" cy="0"/>
+          <a:chOff x="0" y="0"/>
+          <a:chExt cx="0" cy="0"/>
+        </a:xfrm>
+      </p:grpSpPr>
+      <p:sp>
+        <p:nvSpPr>
+          <p:cNvPr id="2" name="사각형: 모서리가 접힌 도형 1">
+            <a:extLst>
+              <a:ext uri="{FF2B5EF4-FFF2-40B4-BE49-F238E27FC236}">
+                <a16:creationId xmlns:a16="http://schemas.microsoft.com/office/drawing/2014/main" id="{F482A274-724B-7A02-69C6-41BCD3B16BD8}"/>
+              </a:ext>
+            </a:extLst>
+          </p:cNvPr>
+          <p:cNvSpPr/>
+          <p:nvPr/>
+        </p:nvSpPr>
+        <p:spPr>
+          <a:xfrm>
+            <a:off x="1066801" y="1474645"/>
+            <a:ext cx="1362635" cy="1676400"/>
+          </a:xfrm>
+          <a:prstGeom prst="foldedCorner">
+            <a:avLst/>
+          </a:prstGeom>
+          <a:solidFill>
+            <a:srgbClr val="FF6161"/>
+          </a:solidFill>
+          <a:ln w="38100">
+            <a:solidFill>
+              <a:schemeClr val="bg1"/>
+            </a:solidFill>
+          </a:ln>
+        </p:spPr>
+        <p:style>
+          <a:lnRef idx="2">
+            <a:schemeClr val="accent1">
+              <a:shade val="50000"/>
+            </a:schemeClr>
+          </a:lnRef>
+          <a:fillRef idx="1">
+            <a:schemeClr val="accent1"/>
+          </a:fillRef>
+          <a:effectRef idx="0">
+            <a:schemeClr val="accent1"/>
+          </a:effectRef>
+          <a:fontRef idx="minor">
+            <a:schemeClr val="lt1"/>
+          </a:fontRef>
+        </p:style>
+        <p:txBody>
+          <a:bodyPr rtlCol="0" anchor="ctr"/>
+          <a:lstStyle/>
+          <a:p>
+            <a:pPr algn="ctr"/>
+            <a:endParaRPr lang="ko-KR" altLang="en-US"/>
+          </a:p>
+        </p:txBody>
+      </p:sp>
+      <p:sp>
+        <p:nvSpPr>
+          <p:cNvPr id="4" name="TextBox 3">
+            <a:extLst>
+              <a:ext uri="{FF2B5EF4-FFF2-40B4-BE49-F238E27FC236}">
+                <a16:creationId xmlns:a16="http://schemas.microsoft.com/office/drawing/2014/main" id="{77EA343B-A354-10CB-3439-AA501C4B92C1}"/>
+              </a:ext>
+            </a:extLst>
+          </p:cNvPr>
+          <p:cNvSpPr txBox="1"/>
+          <p:nvPr/>
+        </p:nvSpPr>
+        <p:spPr>
+          <a:xfrm>
+            <a:off x="1066801" y="1474645"/>
+            <a:ext cx="1165412" cy="338554"/>
+          </a:xfrm>
+          <a:prstGeom prst="rect">
+            <a:avLst/>
+          </a:prstGeom>
+          <a:noFill/>
+        </p:spPr>
+        <p:txBody>
+          <a:bodyPr wrap="square" rtlCol="0">
+            <a:spAutoFit/>
+          </a:bodyPr>
+          <a:lstStyle/>
+          <a:p>
+            <a:r>
+              <a:rPr lang="en-US" altLang="ko-KR" sz="1600" dirty="0">
+                <a:solidFill>
+                  <a:schemeClr val="bg1"/>
+                </a:solidFill>
+              </a:rPr>
+              <a:t>Class</a:t>
+            </a:r>
+            <a:endParaRPr lang="ko-KR" altLang="en-US" sz="1600" dirty="0">
+              <a:solidFill>
+                <a:schemeClr val="bg1"/>
+              </a:solidFill>
+            </a:endParaRPr>
+          </a:p>
+        </p:txBody>
+      </p:sp>
+      <p:sp>
+        <p:nvSpPr>
+          <p:cNvPr id="5" name="사각형: 모서리가 접힌 도형 4">
+            <a:extLst>
+              <a:ext uri="{FF2B5EF4-FFF2-40B4-BE49-F238E27FC236}">
+                <a16:creationId xmlns:a16="http://schemas.microsoft.com/office/drawing/2014/main" id="{A64700D9-29E0-01F0-829F-03B845CBB38C}"/>
+              </a:ext>
+            </a:extLst>
+          </p:cNvPr>
+          <p:cNvSpPr/>
+          <p:nvPr/>
+        </p:nvSpPr>
+        <p:spPr>
+          <a:xfrm>
+            <a:off x="1335742" y="1852878"/>
+            <a:ext cx="1362635" cy="1676400"/>
+          </a:xfrm>
+          <a:prstGeom prst="foldedCorner">
+            <a:avLst/>
+          </a:prstGeom>
+          <a:solidFill>
+            <a:srgbClr val="FF6161"/>
+          </a:solidFill>
+          <a:ln w="38100">
+            <a:solidFill>
+              <a:schemeClr val="bg1"/>
+            </a:solidFill>
+          </a:ln>
+        </p:spPr>
+        <p:style>
+          <a:lnRef idx="2">
+            <a:schemeClr val="accent1">
+              <a:shade val="50000"/>
+            </a:schemeClr>
+          </a:lnRef>
+          <a:fillRef idx="1">
+            <a:schemeClr val="accent1"/>
+          </a:fillRef>
+          <a:effectRef idx="0">
+            <a:schemeClr val="accent1"/>
+          </a:effectRef>
+          <a:fontRef idx="minor">
+            <a:schemeClr val="lt1"/>
+          </a:fontRef>
+        </p:style>
+        <p:txBody>
+          <a:bodyPr rtlCol="0" anchor="ctr"/>
+          <a:lstStyle/>
+          <a:p>
+            <a:pPr algn="ctr"/>
+            <a:endParaRPr lang="ko-KR" altLang="en-US"/>
+          </a:p>
+        </p:txBody>
+      </p:sp>
+      <p:sp>
+        <p:nvSpPr>
+          <p:cNvPr id="6" name="TextBox 5">
+            <a:extLst>
+              <a:ext uri="{FF2B5EF4-FFF2-40B4-BE49-F238E27FC236}">
+                <a16:creationId xmlns:a16="http://schemas.microsoft.com/office/drawing/2014/main" id="{C8748B70-C531-0E82-B751-584E1AAA8D24}"/>
+              </a:ext>
+            </a:extLst>
+          </p:cNvPr>
+          <p:cNvSpPr txBox="1"/>
+          <p:nvPr/>
+        </p:nvSpPr>
+        <p:spPr>
+          <a:xfrm>
+            <a:off x="1335742" y="1878057"/>
+            <a:ext cx="1165412" cy="338554"/>
+          </a:xfrm>
+          <a:prstGeom prst="rect">
+            <a:avLst/>
+          </a:prstGeom>
+          <a:noFill/>
+        </p:spPr>
+        <p:txBody>
+          <a:bodyPr wrap="square" rtlCol="0">
+            <a:spAutoFit/>
+          </a:bodyPr>
+          <a:lstStyle/>
+          <a:p>
+            <a:r>
+              <a:rPr lang="en-US" altLang="ko-KR" sz="1600" dirty="0">
+                <a:solidFill>
+                  <a:schemeClr val="bg1"/>
+                </a:solidFill>
+              </a:rPr>
+              <a:t>Class</a:t>
+            </a:r>
+            <a:endParaRPr lang="ko-KR" altLang="en-US" sz="1600" dirty="0">
+              <a:solidFill>
+                <a:schemeClr val="bg1"/>
+              </a:solidFill>
+            </a:endParaRPr>
+          </a:p>
+        </p:txBody>
+      </p:sp>
+      <p:sp>
+        <p:nvSpPr>
+          <p:cNvPr id="7" name="사각형: 모서리가 접힌 도형 6">
+            <a:extLst>
+              <a:ext uri="{FF2B5EF4-FFF2-40B4-BE49-F238E27FC236}">
+                <a16:creationId xmlns:a16="http://schemas.microsoft.com/office/drawing/2014/main" id="{473D2431-1053-680B-ACCA-92846D199B56}"/>
+              </a:ext>
+            </a:extLst>
+          </p:cNvPr>
+          <p:cNvSpPr/>
+          <p:nvPr/>
+        </p:nvSpPr>
+        <p:spPr>
+          <a:xfrm>
+            <a:off x="1649507" y="2241790"/>
+            <a:ext cx="1362635" cy="1676400"/>
+          </a:xfrm>
+          <a:prstGeom prst="foldedCorner">
+            <a:avLst/>
+          </a:prstGeom>
+          <a:solidFill>
+            <a:srgbClr val="FF6161"/>
+          </a:solidFill>
+          <a:ln w="38100">
+            <a:solidFill>
+              <a:schemeClr val="bg1"/>
+            </a:solidFill>
+          </a:ln>
+        </p:spPr>
+        <p:style>
+          <a:lnRef idx="2">
+            <a:schemeClr val="accent1">
+              <a:shade val="50000"/>
+            </a:schemeClr>
+          </a:lnRef>
+          <a:fillRef idx="1">
+            <a:schemeClr val="accent1"/>
+          </a:fillRef>
+          <a:effectRef idx="0">
+            <a:schemeClr val="accent1"/>
+          </a:effectRef>
+          <a:fontRef idx="minor">
+            <a:schemeClr val="lt1"/>
+          </a:fontRef>
+        </p:style>
+        <p:txBody>
+          <a:bodyPr rtlCol="0" anchor="ctr"/>
+          <a:lstStyle/>
+          <a:p>
+            <a:pPr algn="ctr"/>
+            <a:endParaRPr lang="ko-KR" altLang="en-US"/>
+          </a:p>
+        </p:txBody>
+      </p:sp>
+      <p:sp>
+        <p:nvSpPr>
+          <p:cNvPr id="8" name="TextBox 7">
+            <a:extLst>
+              <a:ext uri="{FF2B5EF4-FFF2-40B4-BE49-F238E27FC236}">
+                <a16:creationId xmlns:a16="http://schemas.microsoft.com/office/drawing/2014/main" id="{1CB1918E-88CC-8427-188F-081D70ED10A3}"/>
+              </a:ext>
+            </a:extLst>
+          </p:cNvPr>
+          <p:cNvSpPr txBox="1"/>
+          <p:nvPr/>
+        </p:nvSpPr>
+        <p:spPr>
+          <a:xfrm>
+            <a:off x="1649507" y="2241790"/>
+            <a:ext cx="1165412" cy="338554"/>
+          </a:xfrm>
+          <a:prstGeom prst="rect">
+            <a:avLst/>
+          </a:prstGeom>
+          <a:noFill/>
+        </p:spPr>
+        <p:txBody>
+          <a:bodyPr wrap="square" rtlCol="0">
+            <a:spAutoFit/>
+          </a:bodyPr>
+          <a:lstStyle/>
+          <a:p>
+            <a:r>
+              <a:rPr lang="en-US" altLang="ko-KR" sz="1600" dirty="0">
+                <a:solidFill>
+                  <a:schemeClr val="bg1"/>
+                </a:solidFill>
+              </a:rPr>
+              <a:t>Class</a:t>
+            </a:r>
+            <a:endParaRPr lang="ko-KR" altLang="en-US" sz="1600" dirty="0">
+              <a:solidFill>
+                <a:schemeClr val="bg1"/>
+              </a:solidFill>
+            </a:endParaRPr>
+          </a:p>
+        </p:txBody>
+      </p:sp>
+      <p:sp>
+        <p:nvSpPr>
+          <p:cNvPr id="11" name="원통형 10">
+            <a:extLst>
+              <a:ext uri="{FF2B5EF4-FFF2-40B4-BE49-F238E27FC236}">
+                <a16:creationId xmlns:a16="http://schemas.microsoft.com/office/drawing/2014/main" id="{BB8CC784-AEC2-DCAF-6BA8-D24169B840DF}"/>
+              </a:ext>
+            </a:extLst>
+          </p:cNvPr>
+          <p:cNvSpPr/>
+          <p:nvPr/>
+        </p:nvSpPr>
+        <p:spPr>
+          <a:xfrm>
+            <a:off x="8264334" y="1238394"/>
+            <a:ext cx="2803715" cy="3278304"/>
+          </a:xfrm>
+          <a:prstGeom prst="can">
+            <a:avLst/>
+          </a:prstGeom>
+          <a:solidFill>
+            <a:srgbClr val="9999FF"/>
+          </a:solidFill>
+          <a:ln>
+            <a:noFill/>
+          </a:ln>
+        </p:spPr>
+        <p:style>
+          <a:lnRef idx="2">
+            <a:schemeClr val="accent1">
+              <a:shade val="50000"/>
+            </a:schemeClr>
+          </a:lnRef>
+          <a:fillRef idx="1">
+            <a:schemeClr val="accent1"/>
+          </a:fillRef>
+          <a:effectRef idx="0">
+            <a:schemeClr val="accent1"/>
+          </a:effectRef>
+          <a:fontRef idx="minor">
+            <a:schemeClr val="lt1"/>
+          </a:fontRef>
+        </p:style>
+        <p:txBody>
+          <a:bodyPr rtlCol="0" anchor="ctr"/>
+          <a:lstStyle/>
+          <a:p>
+            <a:pPr algn="ctr"/>
+            <a:endParaRPr lang="ko-KR" altLang="en-US"/>
+          </a:p>
+        </p:txBody>
+      </p:sp>
+      <p:sp>
+        <p:nvSpPr>
+          <p:cNvPr id="14" name="순서도: 내부 저장소 13">
+            <a:extLst>
+              <a:ext uri="{FF2B5EF4-FFF2-40B4-BE49-F238E27FC236}">
+                <a16:creationId xmlns:a16="http://schemas.microsoft.com/office/drawing/2014/main" id="{418D44C5-F004-6703-1A51-D11186399744}"/>
+              </a:ext>
+            </a:extLst>
+          </p:cNvPr>
+          <p:cNvSpPr/>
+          <p:nvPr/>
+        </p:nvSpPr>
+        <p:spPr>
+          <a:xfrm>
+            <a:off x="8581463" y="2047333"/>
+            <a:ext cx="1362635" cy="1211951"/>
+          </a:xfrm>
+          <a:prstGeom prst="flowChartInternalStorage">
+            <a:avLst/>
+          </a:prstGeom>
+          <a:solidFill>
+            <a:srgbClr val="0AA1DD"/>
+          </a:solidFill>
+          <a:ln>
+            <a:solidFill>
+              <a:schemeClr val="bg1"/>
+            </a:solidFill>
+          </a:ln>
+        </p:spPr>
+        <p:style>
+          <a:lnRef idx="2">
+            <a:schemeClr val="accent1">
+              <a:shade val="50000"/>
+            </a:schemeClr>
+          </a:lnRef>
+          <a:fillRef idx="1">
+            <a:schemeClr val="accent1"/>
+          </a:fillRef>
+          <a:effectRef idx="0">
+            <a:schemeClr val="accent1"/>
+          </a:effectRef>
+          <a:fontRef idx="minor">
+            <a:schemeClr val="lt1"/>
+          </a:fontRef>
+        </p:style>
+        <p:txBody>
+          <a:bodyPr rtlCol="0" anchor="ctr"/>
+          <a:lstStyle/>
+          <a:p>
+            <a:pPr algn="ctr"/>
+            <a:endParaRPr lang="ko-KR" altLang="en-US"/>
+          </a:p>
+        </p:txBody>
+      </p:sp>
+      <p:sp>
+        <p:nvSpPr>
+          <p:cNvPr id="15" name="TextBox 14">
+            <a:extLst>
+              <a:ext uri="{FF2B5EF4-FFF2-40B4-BE49-F238E27FC236}">
+                <a16:creationId xmlns:a16="http://schemas.microsoft.com/office/drawing/2014/main" id="{FF85C448-5BFD-87F2-0772-7F86D293D4A4}"/>
+              </a:ext>
+            </a:extLst>
+          </p:cNvPr>
+          <p:cNvSpPr txBox="1"/>
+          <p:nvPr/>
+        </p:nvSpPr>
+        <p:spPr>
+          <a:xfrm>
+            <a:off x="8759637" y="2229169"/>
+            <a:ext cx="1184461" cy="338555"/>
+          </a:xfrm>
+          <a:prstGeom prst="rect">
+            <a:avLst/>
+          </a:prstGeom>
+          <a:noFill/>
+        </p:spPr>
+        <p:txBody>
+          <a:bodyPr wrap="square" rtlCol="0">
+            <a:spAutoFit/>
+          </a:bodyPr>
+          <a:lstStyle/>
+          <a:p>
+            <a:r>
+              <a:rPr lang="en-US" altLang="ko-KR" sz="1400" dirty="0">
+                <a:solidFill>
+                  <a:schemeClr val="bg1"/>
+                </a:solidFill>
+              </a:rPr>
+              <a:t>Table</a:t>
+            </a:r>
+            <a:endParaRPr lang="ko-KR" altLang="en-US" sz="1400" dirty="0">
+              <a:solidFill>
+                <a:schemeClr val="bg1"/>
+              </a:solidFill>
+            </a:endParaRPr>
+          </a:p>
+        </p:txBody>
+      </p:sp>
+      <p:sp>
+        <p:nvSpPr>
+          <p:cNvPr id="16" name="순서도: 내부 저장소 15">
+            <a:extLst>
+              <a:ext uri="{FF2B5EF4-FFF2-40B4-BE49-F238E27FC236}">
+                <a16:creationId xmlns:a16="http://schemas.microsoft.com/office/drawing/2014/main" id="{81787FFF-AE2D-92C3-2D76-1B513D15B4B5}"/>
+              </a:ext>
+            </a:extLst>
+          </p:cNvPr>
+          <p:cNvSpPr/>
+          <p:nvPr/>
+        </p:nvSpPr>
+        <p:spPr>
+          <a:xfrm>
+            <a:off x="8885143" y="2564730"/>
+            <a:ext cx="1362635" cy="1211951"/>
+          </a:xfrm>
+          <a:prstGeom prst="flowChartInternalStorage">
+            <a:avLst/>
+          </a:prstGeom>
+          <a:solidFill>
+            <a:srgbClr val="0AA1DD"/>
+          </a:solidFill>
+          <a:ln>
+            <a:solidFill>
+              <a:schemeClr val="bg1"/>
+            </a:solidFill>
+          </a:ln>
+        </p:spPr>
+        <p:style>
+          <a:lnRef idx="2">
+            <a:schemeClr val="accent1">
+              <a:shade val="50000"/>
+            </a:schemeClr>
+          </a:lnRef>
+          <a:fillRef idx="1">
+            <a:schemeClr val="accent1"/>
+          </a:fillRef>
+          <a:effectRef idx="0">
+            <a:schemeClr val="accent1"/>
+          </a:effectRef>
+          <a:fontRef idx="minor">
+            <a:schemeClr val="lt1"/>
+          </a:fontRef>
+        </p:style>
+        <p:txBody>
+          <a:bodyPr rtlCol="0" anchor="ctr"/>
+          <a:lstStyle/>
+          <a:p>
+            <a:pPr algn="ctr"/>
+            <a:endParaRPr lang="ko-KR" altLang="en-US"/>
+          </a:p>
+        </p:txBody>
+      </p:sp>
+      <p:sp>
+        <p:nvSpPr>
+          <p:cNvPr id="17" name="TextBox 16">
+            <a:extLst>
+              <a:ext uri="{FF2B5EF4-FFF2-40B4-BE49-F238E27FC236}">
+                <a16:creationId xmlns:a16="http://schemas.microsoft.com/office/drawing/2014/main" id="{D0662888-81ED-E950-C810-BE5B7DC5B662}"/>
+              </a:ext>
+            </a:extLst>
+          </p:cNvPr>
+          <p:cNvSpPr txBox="1"/>
+          <p:nvPr/>
+        </p:nvSpPr>
+        <p:spPr>
+          <a:xfrm>
+            <a:off x="9063317" y="2746566"/>
+            <a:ext cx="1184461" cy="338555"/>
+          </a:xfrm>
+          <a:prstGeom prst="rect">
+            <a:avLst/>
+          </a:prstGeom>
+          <a:noFill/>
+        </p:spPr>
+        <p:txBody>
+          <a:bodyPr wrap="square" rtlCol="0">
+            <a:spAutoFit/>
+          </a:bodyPr>
+          <a:lstStyle/>
+          <a:p>
+            <a:r>
+              <a:rPr lang="en-US" altLang="ko-KR" sz="1400" dirty="0">
+                <a:solidFill>
+                  <a:schemeClr val="bg1"/>
+                </a:solidFill>
+              </a:rPr>
+              <a:t>Table</a:t>
+            </a:r>
+            <a:endParaRPr lang="ko-KR" altLang="en-US" sz="1400" dirty="0">
+              <a:solidFill>
+                <a:schemeClr val="bg1"/>
+              </a:solidFill>
+            </a:endParaRPr>
+          </a:p>
+        </p:txBody>
+      </p:sp>
+      <p:sp>
+        <p:nvSpPr>
+          <p:cNvPr id="18" name="순서도: 내부 저장소 17">
+            <a:extLst>
+              <a:ext uri="{FF2B5EF4-FFF2-40B4-BE49-F238E27FC236}">
+                <a16:creationId xmlns:a16="http://schemas.microsoft.com/office/drawing/2014/main" id="{8F6A718F-A9EB-58F4-4CAA-FF75012FBDBD}"/>
+              </a:ext>
+            </a:extLst>
+          </p:cNvPr>
+          <p:cNvSpPr/>
+          <p:nvPr/>
+        </p:nvSpPr>
+        <p:spPr>
+          <a:xfrm>
+            <a:off x="9262780" y="3085121"/>
+            <a:ext cx="1362635" cy="1211951"/>
+          </a:xfrm>
+          <a:prstGeom prst="flowChartInternalStorage">
+            <a:avLst/>
+          </a:prstGeom>
+          <a:solidFill>
+            <a:srgbClr val="0AA1DD"/>
+          </a:solidFill>
+          <a:ln>
+            <a:solidFill>
+              <a:schemeClr val="bg1"/>
+            </a:solidFill>
+          </a:ln>
+        </p:spPr>
+        <p:style>
+          <a:lnRef idx="2">
+            <a:schemeClr val="accent1">
+              <a:shade val="50000"/>
+            </a:schemeClr>
+          </a:lnRef>
+          <a:fillRef idx="1">
+            <a:schemeClr val="accent1"/>
+          </a:fillRef>
+          <a:effectRef idx="0">
+            <a:schemeClr val="accent1"/>
+          </a:effectRef>
+          <a:fontRef idx="minor">
+            <a:schemeClr val="lt1"/>
+          </a:fontRef>
+        </p:style>
+        <p:txBody>
+          <a:bodyPr rtlCol="0" anchor="ctr"/>
+          <a:lstStyle/>
+          <a:p>
+            <a:pPr algn="ctr"/>
+            <a:endParaRPr lang="ko-KR" altLang="en-US"/>
+          </a:p>
+        </p:txBody>
+      </p:sp>
+      <p:sp>
+        <p:nvSpPr>
+          <p:cNvPr id="19" name="TextBox 18">
+            <a:extLst>
+              <a:ext uri="{FF2B5EF4-FFF2-40B4-BE49-F238E27FC236}">
+                <a16:creationId xmlns:a16="http://schemas.microsoft.com/office/drawing/2014/main" id="{DEA41B1C-CFB0-681B-CD2D-4ACDAD3678F5}"/>
+              </a:ext>
+            </a:extLst>
+          </p:cNvPr>
+          <p:cNvSpPr txBox="1"/>
+          <p:nvPr/>
+        </p:nvSpPr>
+        <p:spPr>
+          <a:xfrm>
+            <a:off x="9440954" y="3266957"/>
+            <a:ext cx="1184461" cy="338555"/>
+          </a:xfrm>
+          <a:prstGeom prst="rect">
+            <a:avLst/>
+          </a:prstGeom>
+          <a:noFill/>
+        </p:spPr>
+        <p:txBody>
+          <a:bodyPr wrap="square" rtlCol="0">
+            <a:spAutoFit/>
+          </a:bodyPr>
+          <a:lstStyle/>
+          <a:p>
+            <a:r>
+              <a:rPr lang="en-US" altLang="ko-KR" sz="1400" dirty="0">
+                <a:solidFill>
+                  <a:schemeClr val="bg1"/>
+                </a:solidFill>
+              </a:rPr>
+              <a:t>Table</a:t>
+            </a:r>
+            <a:endParaRPr lang="ko-KR" altLang="en-US" sz="1400" dirty="0">
+              <a:solidFill>
+                <a:schemeClr val="bg1"/>
+              </a:solidFill>
+            </a:endParaRPr>
+          </a:p>
+        </p:txBody>
+      </p:sp>
+      <p:cxnSp>
+        <p:nvCxnSpPr>
+          <p:cNvPr id="21" name="직선 화살표 연결선 20">
+            <a:extLst>
+              <a:ext uri="{FF2B5EF4-FFF2-40B4-BE49-F238E27FC236}">
+                <a16:creationId xmlns:a16="http://schemas.microsoft.com/office/drawing/2014/main" id="{2AC80C1B-1E83-E7EF-F464-04BF0A38834E}"/>
+              </a:ext>
+            </a:extLst>
+          </p:cNvPr>
+          <p:cNvCxnSpPr>
+            <a:cxnSpLocks/>
+          </p:cNvCxnSpPr>
+          <p:nvPr/>
+        </p:nvCxnSpPr>
+        <p:spPr>
+          <a:xfrm>
+            <a:off x="3246351" y="2764496"/>
+            <a:ext cx="932328" cy="0"/>
+          </a:xfrm>
+          <a:prstGeom prst="straightConnector1">
+            <a:avLst/>
+          </a:prstGeom>
+          <a:ln w="38100">
+            <a:solidFill>
+              <a:schemeClr val="accent4"/>
+            </a:solidFill>
+            <a:headEnd type="none" w="med" len="med"/>
+            <a:tailEnd type="triangle"/>
+          </a:ln>
+        </p:spPr>
+        <p:style>
+          <a:lnRef idx="1">
+            <a:schemeClr val="accent1"/>
+          </a:lnRef>
+          <a:fillRef idx="0">
+            <a:schemeClr val="accent1"/>
+          </a:fillRef>
+          <a:effectRef idx="0">
+            <a:schemeClr val="accent1"/>
+          </a:effectRef>
+          <a:fontRef idx="minor">
+            <a:schemeClr val="tx1"/>
+          </a:fontRef>
+        </p:style>
+      </p:cxnSp>
+      <p:sp>
+        <p:nvSpPr>
+          <p:cNvPr id="22" name="순서도: 종속 처리 21">
+            <a:extLst>
+              <a:ext uri="{FF2B5EF4-FFF2-40B4-BE49-F238E27FC236}">
+                <a16:creationId xmlns:a16="http://schemas.microsoft.com/office/drawing/2014/main" id="{C086CFE1-E3D3-7FE6-18E6-EA234428A59F}"/>
+              </a:ext>
+            </a:extLst>
+          </p:cNvPr>
+          <p:cNvSpPr/>
+          <p:nvPr/>
+        </p:nvSpPr>
+        <p:spPr>
+          <a:xfrm>
+            <a:off x="4626907" y="2037597"/>
+            <a:ext cx="2043954" cy="1417938"/>
+          </a:xfrm>
+          <a:prstGeom prst="flowChartPredefinedProcess">
+            <a:avLst/>
+          </a:prstGeom>
+          <a:solidFill>
+            <a:srgbClr val="6D18A1"/>
+          </a:solidFill>
+          <a:ln>
+            <a:solidFill>
+              <a:schemeClr val="bg1"/>
+            </a:solidFill>
+          </a:ln>
+        </p:spPr>
+        <p:style>
+          <a:lnRef idx="2">
+            <a:schemeClr val="accent1">
+              <a:shade val="50000"/>
+            </a:schemeClr>
+          </a:lnRef>
+          <a:fillRef idx="1">
+            <a:schemeClr val="accent1"/>
+          </a:fillRef>
+          <a:effectRef idx="0">
+            <a:schemeClr val="accent1"/>
+          </a:effectRef>
+          <a:fontRef idx="minor">
+            <a:schemeClr val="lt1"/>
+          </a:fontRef>
+        </p:style>
+        <p:txBody>
+          <a:bodyPr rtlCol="0" anchor="ctr"/>
+          <a:lstStyle/>
+          <a:p>
+            <a:pPr algn="ctr"/>
+            <a:endParaRPr lang="ko-KR" altLang="en-US"/>
+          </a:p>
+        </p:txBody>
+      </p:sp>
+      <p:sp>
+        <p:nvSpPr>
+          <p:cNvPr id="23" name="TextBox 22">
+            <a:extLst>
+              <a:ext uri="{FF2B5EF4-FFF2-40B4-BE49-F238E27FC236}">
+                <a16:creationId xmlns:a16="http://schemas.microsoft.com/office/drawing/2014/main" id="{4EF5D4C3-84FF-3D41-4757-FC405F4229B3}"/>
+              </a:ext>
+            </a:extLst>
+          </p:cNvPr>
+          <p:cNvSpPr txBox="1"/>
+          <p:nvPr/>
+        </p:nvSpPr>
+        <p:spPr>
+          <a:xfrm>
+            <a:off x="4645954" y="2560033"/>
+            <a:ext cx="2024907" cy="307777"/>
+          </a:xfrm>
+          <a:prstGeom prst="rect">
+            <a:avLst/>
+          </a:prstGeom>
+          <a:noFill/>
+        </p:spPr>
+        <p:txBody>
+          <a:bodyPr wrap="square" rtlCol="0">
+            <a:spAutoFit/>
+          </a:bodyPr>
+          <a:lstStyle/>
+          <a:p>
+            <a:pPr algn="ctr"/>
+            <a:r>
+              <a:rPr lang="en-US" altLang="ko-KR" sz="1400" dirty="0">
+                <a:solidFill>
+                  <a:schemeClr val="bg1"/>
+                </a:solidFill>
+              </a:rPr>
+              <a:t>Entity Framework</a:t>
+            </a:r>
+            <a:endParaRPr lang="ko-KR" altLang="en-US" sz="1400" dirty="0">
+              <a:solidFill>
+                <a:schemeClr val="bg1"/>
+              </a:solidFill>
+            </a:endParaRPr>
+          </a:p>
+        </p:txBody>
+      </p:sp>
+      <p:cxnSp>
+        <p:nvCxnSpPr>
+          <p:cNvPr id="25" name="직선 화살표 연결선 24">
+            <a:extLst>
+              <a:ext uri="{FF2B5EF4-FFF2-40B4-BE49-F238E27FC236}">
+                <a16:creationId xmlns:a16="http://schemas.microsoft.com/office/drawing/2014/main" id="{D7F305DA-1709-E6C6-B80E-4573A8942412}"/>
+              </a:ext>
+            </a:extLst>
+          </p:cNvPr>
+          <p:cNvCxnSpPr>
+            <a:cxnSpLocks/>
+          </p:cNvCxnSpPr>
+          <p:nvPr/>
+        </p:nvCxnSpPr>
+        <p:spPr>
+          <a:xfrm>
+            <a:off x="6974541" y="2764496"/>
+            <a:ext cx="932328" cy="0"/>
+          </a:xfrm>
+          <a:prstGeom prst="straightConnector1">
+            <a:avLst/>
+          </a:prstGeom>
+          <a:ln w="38100">
+            <a:solidFill>
+              <a:schemeClr val="accent4"/>
+            </a:solidFill>
+            <a:headEnd type="none" w="med" len="med"/>
+            <a:tailEnd type="triangle"/>
+          </a:ln>
+        </p:spPr>
+        <p:style>
+          <a:lnRef idx="1">
+            <a:schemeClr val="accent1"/>
+          </a:lnRef>
+          <a:fillRef idx="0">
+            <a:schemeClr val="accent1"/>
+          </a:fillRef>
+          <a:effectRef idx="0">
+            <a:schemeClr val="accent1"/>
+          </a:effectRef>
+          <a:fontRef idx="minor">
+            <a:schemeClr val="tx1"/>
+          </a:fontRef>
+        </p:style>
+      </p:cxnSp>
+    </p:spTree>
+    <p:extLst>
+      <p:ext uri="{BB962C8B-B14F-4D97-AF65-F5344CB8AC3E}">
+        <p14:creationId xmlns:p14="http://schemas.microsoft.com/office/powerpoint/2010/main" val="3574804424"/>
       </p:ext>
     </p:extLst>
   </p:cSld>

</xml_diff>